<commit_message>
lots of pending stuff
</commit_message>
<xml_diff>
--- a/myPaper/figures/keyManipulation.pptx
+++ b/myPaper/figures/keyManipulation.pptx
@@ -104,6 +104,11 @@
       </a:defRPr>
     </a:lvl9pPr>
   </p:defaultTextStyle>
+  <p:extLst>
+    <p:ext uri="{EFAFB233-063F-42B5-8137-9DF3F51BA10A}">
+      <p15:sldGuideLst xmlns:p15="http://schemas.microsoft.com/office/powerpoint/2012/main"/>
+    </p:ext>
+  </p:extLst>
 </p:presentation>
 </file>
 
@@ -254,7 +259,7 @@
           <a:p>
             <a:fld id="{64BD80C9-C1D9-4EF8-9FAC-3668A35FC0C8}" type="datetimeFigureOut">
               <a:rPr lang="en-US" smtClean="0"/>
-              <a:t>6/6/2020</a:t>
+              <a:t>11/14/2020</a:t>
             </a:fld>
             <a:endParaRPr lang="en-US"/>
           </a:p>
@@ -452,7 +457,7 @@
           <a:p>
             <a:fld id="{64BD80C9-C1D9-4EF8-9FAC-3668A35FC0C8}" type="datetimeFigureOut">
               <a:rPr lang="en-US" smtClean="0"/>
-              <a:t>6/6/2020</a:t>
+              <a:t>11/14/2020</a:t>
             </a:fld>
             <a:endParaRPr lang="en-US"/>
           </a:p>
@@ -660,7 +665,7 @@
           <a:p>
             <a:fld id="{64BD80C9-C1D9-4EF8-9FAC-3668A35FC0C8}" type="datetimeFigureOut">
               <a:rPr lang="en-US" smtClean="0"/>
-              <a:t>6/6/2020</a:t>
+              <a:t>11/14/2020</a:t>
             </a:fld>
             <a:endParaRPr lang="en-US"/>
           </a:p>
@@ -858,7 +863,7 @@
           <a:p>
             <a:fld id="{64BD80C9-C1D9-4EF8-9FAC-3668A35FC0C8}" type="datetimeFigureOut">
               <a:rPr lang="en-US" smtClean="0"/>
-              <a:t>6/6/2020</a:t>
+              <a:t>11/14/2020</a:t>
             </a:fld>
             <a:endParaRPr lang="en-US"/>
           </a:p>
@@ -1133,7 +1138,7 @@
           <a:p>
             <a:fld id="{64BD80C9-C1D9-4EF8-9FAC-3668A35FC0C8}" type="datetimeFigureOut">
               <a:rPr lang="en-US" smtClean="0"/>
-              <a:t>6/6/2020</a:t>
+              <a:t>11/14/2020</a:t>
             </a:fld>
             <a:endParaRPr lang="en-US"/>
           </a:p>
@@ -1398,7 +1403,7 @@
           <a:p>
             <a:fld id="{64BD80C9-C1D9-4EF8-9FAC-3668A35FC0C8}" type="datetimeFigureOut">
               <a:rPr lang="en-US" smtClean="0"/>
-              <a:t>6/6/2020</a:t>
+              <a:t>11/14/2020</a:t>
             </a:fld>
             <a:endParaRPr lang="en-US"/>
           </a:p>
@@ -1810,7 +1815,7 @@
           <a:p>
             <a:fld id="{64BD80C9-C1D9-4EF8-9FAC-3668A35FC0C8}" type="datetimeFigureOut">
               <a:rPr lang="en-US" smtClean="0"/>
-              <a:t>6/6/2020</a:t>
+              <a:t>11/14/2020</a:t>
             </a:fld>
             <a:endParaRPr lang="en-US"/>
           </a:p>
@@ -1951,7 +1956,7 @@
           <a:p>
             <a:fld id="{64BD80C9-C1D9-4EF8-9FAC-3668A35FC0C8}" type="datetimeFigureOut">
               <a:rPr lang="en-US" smtClean="0"/>
-              <a:t>6/6/2020</a:t>
+              <a:t>11/14/2020</a:t>
             </a:fld>
             <a:endParaRPr lang="en-US"/>
           </a:p>
@@ -2064,7 +2069,7 @@
           <a:p>
             <a:fld id="{64BD80C9-C1D9-4EF8-9FAC-3668A35FC0C8}" type="datetimeFigureOut">
               <a:rPr lang="en-US" smtClean="0"/>
-              <a:t>6/6/2020</a:t>
+              <a:t>11/14/2020</a:t>
             </a:fld>
             <a:endParaRPr lang="en-US"/>
           </a:p>
@@ -2375,7 +2380,7 @@
           <a:p>
             <a:fld id="{64BD80C9-C1D9-4EF8-9FAC-3668A35FC0C8}" type="datetimeFigureOut">
               <a:rPr lang="en-US" smtClean="0"/>
-              <a:t>6/6/2020</a:t>
+              <a:t>11/14/2020</a:t>
             </a:fld>
             <a:endParaRPr lang="en-US"/>
           </a:p>
@@ -2663,7 +2668,7 @@
           <a:p>
             <a:fld id="{64BD80C9-C1D9-4EF8-9FAC-3668A35FC0C8}" type="datetimeFigureOut">
               <a:rPr lang="en-US" smtClean="0"/>
-              <a:t>6/6/2020</a:t>
+              <a:t>11/14/2020</a:t>
             </a:fld>
             <a:endParaRPr lang="en-US"/>
           </a:p>
@@ -2904,7 +2909,7 @@
           <a:p>
             <a:fld id="{64BD80C9-C1D9-4EF8-9FAC-3668A35FC0C8}" type="datetimeFigureOut">
               <a:rPr lang="en-US" smtClean="0"/>
-              <a:t>6/6/2020</a:t>
+              <a:t>11/14/2020</a:t>
             </a:fld>
             <a:endParaRPr lang="en-US"/>
           </a:p>
@@ -3669,8 +3674,8 @@
         </p:nvSpPr>
         <p:spPr>
           <a:xfrm rot="16200000">
-            <a:off x="1871602" y="3946038"/>
-            <a:ext cx="1598214" cy="369332"/>
+            <a:off x="1871602" y="3961427"/>
+            <a:ext cx="1598214" cy="338554"/>
           </a:xfrm>
           <a:prstGeom prst="rect">
             <a:avLst/>
@@ -3684,30 +3689,14 @@
           <a:p>
             <a:pPr algn="ctr"/>
             <a:r>
-              <a:rPr lang="en-US" b="1" dirty="0">
+              <a:rPr lang="en-US" sz="1600" dirty="0">
                 <a:latin typeface="Times New Roman" panose="02020603050405020304" pitchFamily="18" charset="0"/>
                 <a:ea typeface="Calibri" panose="020F0502020204030204" pitchFamily="34" charset="0"/>
                 <a:cs typeface="Times New Roman" panose="02020603050405020304" pitchFamily="18" charset="0"/>
               </a:rPr>
-              <a:t>Not</a:t>
-            </a:r>
-            <a:r>
-              <a:rPr lang="en-US" dirty="0">
-                <a:latin typeface="Times New Roman" panose="02020603050405020304" pitchFamily="18" charset="0"/>
-                <a:ea typeface="Calibri" panose="020F0502020204030204" pitchFamily="34" charset="0"/>
-                <a:cs typeface="Times New Roman" panose="02020603050405020304" pitchFamily="18" charset="0"/>
-              </a:rPr>
-              <a:t> </a:t>
-            </a:r>
-            <a:r>
-              <a:rPr lang="en-US" b="1" dirty="0">
-                <a:latin typeface="Times New Roman" panose="02020603050405020304" pitchFamily="18" charset="0"/>
-                <a:ea typeface="Calibri" panose="020F0502020204030204" pitchFamily="34" charset="0"/>
-                <a:cs typeface="Times New Roman" panose="02020603050405020304" pitchFamily="18" charset="0"/>
-              </a:rPr>
-              <a:t>endowed</a:t>
-            </a:r>
-            <a:endParaRPr lang="en-US" b="1" dirty="0"/>
+              <a:t>Less endowed</a:t>
+            </a:r>
+            <a:endParaRPr lang="en-US" sz="1600" dirty="0"/>
           </a:p>
         </p:txBody>
       </p:sp>
@@ -3725,8 +3714,8 @@
         </p:nvSpPr>
         <p:spPr>
           <a:xfrm rot="16200000">
-            <a:off x="1577984" y="2066131"/>
-            <a:ext cx="2161594" cy="369332"/>
+            <a:off x="1577984" y="2081520"/>
+            <a:ext cx="2161594" cy="338554"/>
           </a:xfrm>
           <a:prstGeom prst="rect">
             <a:avLst/>
@@ -3740,14 +3729,14 @@
           <a:p>
             <a:pPr algn="ctr"/>
             <a:r>
-              <a:rPr lang="en-US" b="1" dirty="0">
+              <a:rPr lang="en-US" sz="1600" dirty="0">
                 <a:latin typeface="Times New Roman" panose="02020603050405020304" pitchFamily="18" charset="0"/>
                 <a:ea typeface="Calibri" panose="020F0502020204030204" pitchFamily="34" charset="0"/>
                 <a:cs typeface="Times New Roman" panose="02020603050405020304" pitchFamily="18" charset="0"/>
               </a:rPr>
-              <a:t>Endowed</a:t>
-            </a:r>
-            <a:endParaRPr lang="en-US" b="1" dirty="0"/>
+              <a:t>More endowed</a:t>
+            </a:r>
+            <a:endParaRPr lang="en-US" sz="1600" dirty="0"/>
           </a:p>
         </p:txBody>
       </p:sp>

</xml_diff>